<commit_message>
Why would I have this in my repo?
</commit_message>
<xml_diff>
--- a/Assets/talk.pptx
+++ b/Assets/talk.pptx
@@ -5,30 +5,32 @@
     <p:sldMasterId id="2147483660" r:id="rId2"/>
   </p:sldMasterIdLst>
   <p:notesMasterIdLst>
-    <p:notesMasterId r:id="rId21"/>
+    <p:notesMasterId r:id="rId23"/>
   </p:notesMasterIdLst>
   <p:handoutMasterIdLst>
-    <p:handoutMasterId r:id="rId22"/>
+    <p:handoutMasterId r:id="rId24"/>
   </p:handoutMasterIdLst>
   <p:sldIdLst>
     <p:sldId id="257" r:id="rId3"/>
     <p:sldId id="268" r:id="rId4"/>
-    <p:sldId id="271" r:id="rId5"/>
-    <p:sldId id="269" r:id="rId6"/>
-    <p:sldId id="273" r:id="rId7"/>
-    <p:sldId id="274" r:id="rId8"/>
-    <p:sldId id="275" r:id="rId9"/>
-    <p:sldId id="289" r:id="rId10"/>
-    <p:sldId id="277" r:id="rId11"/>
-    <p:sldId id="278" r:id="rId12"/>
-    <p:sldId id="276" r:id="rId13"/>
-    <p:sldId id="280" r:id="rId14"/>
-    <p:sldId id="281" r:id="rId15"/>
-    <p:sldId id="290" r:id="rId16"/>
-    <p:sldId id="283" r:id="rId17"/>
-    <p:sldId id="284" r:id="rId18"/>
-    <p:sldId id="287" r:id="rId19"/>
-    <p:sldId id="288" r:id="rId20"/>
+    <p:sldId id="292" r:id="rId5"/>
+    <p:sldId id="271" r:id="rId6"/>
+    <p:sldId id="269" r:id="rId7"/>
+    <p:sldId id="273" r:id="rId8"/>
+    <p:sldId id="274" r:id="rId9"/>
+    <p:sldId id="275" r:id="rId10"/>
+    <p:sldId id="289" r:id="rId11"/>
+    <p:sldId id="277" r:id="rId12"/>
+    <p:sldId id="278" r:id="rId13"/>
+    <p:sldId id="276" r:id="rId14"/>
+    <p:sldId id="280" r:id="rId15"/>
+    <p:sldId id="281" r:id="rId16"/>
+    <p:sldId id="290" r:id="rId17"/>
+    <p:sldId id="283" r:id="rId18"/>
+    <p:sldId id="284" r:id="rId19"/>
+    <p:sldId id="287" r:id="rId20"/>
+    <p:sldId id="288" r:id="rId21"/>
+    <p:sldId id="291" r:id="rId22"/>
   </p:sldIdLst>
   <p:sldSz cx="12188825" cy="6858000"/>
   <p:notesSz cx="6858000" cy="9144000"/>
@@ -5359,15 +5361,7 @@
             </a:r>
             <a:r>
               <a:rPr lang="en-US" dirty="0" smtClean="0"/>
-              <a:t> – Misc. </a:t>
-            </a:r>
-            <a:r>
-              <a:rPr lang="en-US" dirty="0" err="1" smtClean="0"/>
-              <a:t>SignalR</a:t>
-            </a:r>
-            <a:r>
-              <a:rPr lang="en-US" dirty="0" smtClean="0"/>
-              <a:t> Stuff</a:t>
+              <a:t> – Micro-demo.</a:t>
             </a:r>
             <a:endParaRPr lang="en-US" dirty="0"/>
           </a:p>
@@ -5393,6 +5387,219 @@
           <a:bodyPr/>
           <a:lstStyle/>
           <a:p>
+            <a:pPr marL="514350" indent="-514350">
+              <a:buFont typeface="+mj-lt"/>
+              <a:buAutoNum type="arabicPeriod"/>
+            </a:pPr>
+            <a:r>
+              <a:rPr lang="en-US" dirty="0" smtClean="0"/>
+              <a:t>Install-Package </a:t>
+            </a:r>
+            <a:r>
+              <a:rPr lang="en-US" dirty="0" err="1" smtClean="0"/>
+              <a:t>Microsoft.AspNet.SignalR</a:t>
+            </a:r>
+            <a:endParaRPr lang="en-US" dirty="0" smtClean="0"/>
+          </a:p>
+          <a:p>
+            <a:pPr marL="514350" indent="-514350">
+              <a:buFont typeface="+mj-lt"/>
+              <a:buAutoNum type="arabicPeriod"/>
+            </a:pPr>
+            <a:r>
+              <a:rPr lang="en-US" dirty="0" err="1" smtClean="0"/>
+              <a:t>App.MapSignalR</a:t>
+            </a:r>
+            <a:r>
+              <a:rPr lang="en-US" dirty="0" smtClean="0"/>
+              <a:t>()</a:t>
+            </a:r>
+          </a:p>
+          <a:p>
+            <a:pPr marL="514350" indent="-514350">
+              <a:buFont typeface="+mj-lt"/>
+              <a:buAutoNum type="arabicPeriod"/>
+            </a:pPr>
+            <a:r>
+              <a:rPr lang="en-US" dirty="0" smtClean="0"/>
+              <a:t>Create a hub with a simple method.</a:t>
+            </a:r>
+          </a:p>
+          <a:p>
+            <a:pPr marL="514350" indent="-514350">
+              <a:buFont typeface="+mj-lt"/>
+              <a:buAutoNum type="arabicPeriod"/>
+            </a:pPr>
+            <a:r>
+              <a:rPr lang="en-US" dirty="0" smtClean="0"/>
+              <a:t>Create a </a:t>
+            </a:r>
+            <a:r>
+              <a:rPr lang="en-US" dirty="0" err="1" smtClean="0"/>
+              <a:t>js</a:t>
+            </a:r>
+            <a:r>
+              <a:rPr lang="en-US" dirty="0" smtClean="0"/>
+              <a:t> client with a simple method.</a:t>
+            </a:r>
+          </a:p>
+          <a:p>
+            <a:pPr marL="514350" indent="-514350">
+              <a:buFont typeface="+mj-lt"/>
+              <a:buAutoNum type="arabicPeriod"/>
+            </a:pPr>
+            <a:r>
+              <a:rPr lang="en-US" dirty="0" smtClean="0"/>
+              <a:t>Test!</a:t>
+            </a:r>
+          </a:p>
+        </p:txBody>
+      </p:sp>
+      <p:pic>
+        <p:nvPicPr>
+          <p:cNvPr id="2052" name="Picture 4" descr="http://blogciberdotcom.files.wordpress.com/2014/08/signalr.png?w=450"/>
+          <p:cNvPicPr>
+            <a:picLocks noChangeAspect="1" noChangeArrowheads="1"/>
+          </p:cNvPicPr>
+          <p:nvPr/>
+        </p:nvPicPr>
+        <p:blipFill>
+          <a:blip r:embed="rId2">
+            <a:extLst>
+              <a:ext uri="{28A0092B-C50C-407E-A947-70E740481C1C}">
+                <a14:useLocalDpi xmlns:a14="http://schemas.microsoft.com/office/drawing/2010/main" val="0"/>
+              </a:ext>
+            </a:extLst>
+          </a:blip>
+          <a:srcRect/>
+          <a:stretch>
+            <a:fillRect/>
+          </a:stretch>
+        </p:blipFill>
+        <p:spPr bwMode="auto">
+          <a:xfrm>
+            <a:off x="865108" y="1905000"/>
+            <a:ext cx="4286250" cy="2381250"/>
+          </a:xfrm>
+          <a:prstGeom prst="rect">
+            <a:avLst/>
+          </a:prstGeom>
+          <a:noFill/>
+          <a:extLst>
+            <a:ext uri="{909E8E84-426E-40DD-AFC4-6F175D3DCCD1}">
+              <a14:hiddenFill xmlns:a14="http://schemas.microsoft.com/office/drawing/2010/main">
+                <a:solidFill>
+                  <a:srgbClr val="FFFFFF"/>
+                </a:solidFill>
+              </a14:hiddenFill>
+            </a:ext>
+          </a:extLst>
+        </p:spPr>
+      </p:pic>
+    </p:spTree>
+    <p:extLst>
+      <p:ext uri="{BB962C8B-B14F-4D97-AF65-F5344CB8AC3E}">
+        <p14:creationId xmlns:p14="http://schemas.microsoft.com/office/powerpoint/2010/main" val="2177548063"/>
+      </p:ext>
+    </p:extLst>
+  </p:cSld>
+  <p:clrMapOvr>
+    <a:masterClrMapping/>
+  </p:clrMapOvr>
+  <mc:AlternateContent xmlns:mc="http://schemas.openxmlformats.org/markup-compatibility/2006" xmlns:p14="http://schemas.microsoft.com/office/powerpoint/2010/main">
+    <mc:Choice Requires="p14">
+      <p:transition spd="med" p14:dur="700">
+        <p:fade/>
+      </p:transition>
+    </mc:Choice>
+    <mc:Fallback xmlns="">
+      <p:transition spd="med">
+        <p:fade/>
+      </p:transition>
+    </mc:Fallback>
+  </mc:AlternateContent>
+  <p:timing>
+    <p:tnLst>
+      <p:par>
+        <p:cTn id="1" dur="indefinite" restart="never" nodeType="tmRoot"/>
+      </p:par>
+    </p:tnLst>
+  </p:timing>
+</p:sld>
+</file>
+
+<file path=ppt/slides/slide11.xml><?xml version="1.0" encoding="utf-8"?>
+<p:sld xmlns:a="http://schemas.openxmlformats.org/drawingml/2006/main" xmlns:r="http://schemas.openxmlformats.org/officeDocument/2006/relationships" xmlns:p="http://schemas.openxmlformats.org/presentationml/2006/main">
+  <p:cSld>
+    <p:spTree>
+      <p:nvGrpSpPr>
+        <p:cNvPr id="1" name=""/>
+        <p:cNvGrpSpPr/>
+        <p:nvPr/>
+      </p:nvGrpSpPr>
+      <p:grpSpPr>
+        <a:xfrm>
+          <a:off x="0" y="0"/>
+          <a:ext cx="0" cy="0"/>
+          <a:chOff x="0" y="0"/>
+          <a:chExt cx="0" cy="0"/>
+        </a:xfrm>
+      </p:grpSpPr>
+      <p:sp>
+        <p:nvSpPr>
+          <p:cNvPr id="2" name="Title 1"/>
+          <p:cNvSpPr>
+            <a:spLocks noGrp="1"/>
+          </p:cNvSpPr>
+          <p:nvPr>
+            <p:ph type="title"/>
+          </p:nvPr>
+        </p:nvSpPr>
+        <p:spPr/>
+        <p:txBody>
+          <a:bodyPr/>
+          <a:lstStyle/>
+          <a:p>
+            <a:r>
+              <a:rPr lang="en-US" dirty="0" err="1" smtClean="0"/>
+              <a:t>SignalR</a:t>
+            </a:r>
+            <a:r>
+              <a:rPr lang="en-US" dirty="0" smtClean="0"/>
+              <a:t> – Misc. </a:t>
+            </a:r>
+            <a:r>
+              <a:rPr lang="en-US" dirty="0" err="1" smtClean="0"/>
+              <a:t>SignalR</a:t>
+            </a:r>
+            <a:r>
+              <a:rPr lang="en-US" dirty="0" smtClean="0"/>
+              <a:t> Stuff</a:t>
+            </a:r>
+            <a:endParaRPr lang="en-US" dirty="0"/>
+          </a:p>
+        </p:txBody>
+      </p:sp>
+      <p:sp>
+        <p:nvSpPr>
+          <p:cNvPr id="3" name="Content Placeholder 2"/>
+          <p:cNvSpPr>
+            <a:spLocks noGrp="1"/>
+          </p:cNvSpPr>
+          <p:nvPr>
+            <p:ph sz="half" idx="1"/>
+          </p:nvPr>
+        </p:nvSpPr>
+        <p:spPr>
+          <a:xfrm>
+            <a:off x="5151358" y="1752600"/>
+            <a:ext cx="6658054" cy="4465320"/>
+          </a:xfrm>
+        </p:spPr>
+        <p:txBody>
+          <a:bodyPr/>
+          <a:lstStyle/>
+          <a:p>
             <a:r>
               <a:rPr lang="en-US" dirty="0" smtClean="0"/>
               <a:t>Groups</a:t>
@@ -5404,12 +5611,6 @@
               <a:t>ConnectionId</a:t>
             </a:r>
             <a:endParaRPr lang="en-US" dirty="0" smtClean="0"/>
-          </a:p>
-          <a:p>
-            <a:r>
-              <a:rPr lang="en-US" dirty="0" smtClean="0"/>
-              <a:t>Security</a:t>
-            </a:r>
           </a:p>
           <a:p>
             <a:r>
@@ -5492,7 +5693,7 @@
 </p:sld>
 </file>
 
-<file path=ppt/slides/slide11.xml><?xml version="1.0" encoding="utf-8"?>
+<file path=ppt/slides/slide12.xml><?xml version="1.0" encoding="utf-8"?>
 <p:sld xmlns:a="http://schemas.openxmlformats.org/drawingml/2006/main" xmlns:r="http://schemas.openxmlformats.org/officeDocument/2006/relationships" xmlns:p="http://schemas.openxmlformats.org/presentationml/2006/main">
   <p:cSld>
     <p:spTree>
@@ -5691,7 +5892,7 @@
 </p:sld>
 </file>
 
-<file path=ppt/slides/slide12.xml><?xml version="1.0" encoding="utf-8"?>
+<file path=ppt/slides/slide13.xml><?xml version="1.0" encoding="utf-8"?>
 <p:sld xmlns:a="http://schemas.openxmlformats.org/drawingml/2006/main" xmlns:r="http://schemas.openxmlformats.org/officeDocument/2006/relationships" xmlns:p="http://schemas.openxmlformats.org/presentationml/2006/main">
   <p:cSld>
     <p:spTree>
@@ -5855,7 +6056,7 @@
 </p:sld>
 </file>
 
-<file path=ppt/slides/slide13.xml><?xml version="1.0" encoding="utf-8"?>
+<file path=ppt/slides/slide14.xml><?xml version="1.0" encoding="utf-8"?>
 <p:sld xmlns:a="http://schemas.openxmlformats.org/drawingml/2006/main" xmlns:r="http://schemas.openxmlformats.org/officeDocument/2006/relationships" xmlns:p="http://schemas.openxmlformats.org/presentationml/2006/main">
   <p:cSld>
     <p:spTree>
@@ -6050,7 +6251,7 @@
 </p:sld>
 </file>
 
-<file path=ppt/slides/slide14.xml><?xml version="1.0" encoding="utf-8"?>
+<file path=ppt/slides/slide15.xml><?xml version="1.0" encoding="utf-8"?>
 <p:sld xmlns:a="http://schemas.openxmlformats.org/drawingml/2006/main" xmlns:r="http://schemas.openxmlformats.org/officeDocument/2006/relationships" xmlns:p="http://schemas.openxmlformats.org/presentationml/2006/main">
   <p:cSld>
     <p:spTree>
@@ -6233,7 +6434,7 @@
 </p:sld>
 </file>
 
-<file path=ppt/slides/slide15.xml><?xml version="1.0" encoding="utf-8"?>
+<file path=ppt/slides/slide16.xml><?xml version="1.0" encoding="utf-8"?>
 <p:sld xmlns:a="http://schemas.openxmlformats.org/drawingml/2006/main" xmlns:r="http://schemas.openxmlformats.org/officeDocument/2006/relationships" xmlns:p="http://schemas.openxmlformats.org/presentationml/2006/main">
   <p:cSld>
     <p:spTree>
@@ -6410,7 +6611,7 @@
 </p:sld>
 </file>
 
-<file path=ppt/slides/slide16.xml><?xml version="1.0" encoding="utf-8"?>
+<file path=ppt/slides/slide17.xml><?xml version="1.0" encoding="utf-8"?>
 <p:sld xmlns:a="http://schemas.openxmlformats.org/drawingml/2006/main" xmlns:r="http://schemas.openxmlformats.org/officeDocument/2006/relationships" xmlns:p="http://schemas.openxmlformats.org/presentationml/2006/main">
   <p:cSld>
     <p:spTree>
@@ -6555,7 +6756,7 @@
 </p:sld>
 </file>
 
-<file path=ppt/slides/slide17.xml><?xml version="1.0" encoding="utf-8"?>
+<file path=ppt/slides/slide18.xml><?xml version="1.0" encoding="utf-8"?>
 <p:sld xmlns:a="http://schemas.openxmlformats.org/drawingml/2006/main" xmlns:r="http://schemas.openxmlformats.org/officeDocument/2006/relationships" xmlns:p="http://schemas.openxmlformats.org/presentationml/2006/main">
   <p:cSld>
     <p:spTree>
@@ -6639,6 +6840,16 @@
               <a:rPr lang="en-US" dirty="0" smtClean="0"/>
               <a:t>Do you have to pull one document at a time, or can you do more?</a:t>
             </a:r>
+          </a:p>
+          <a:p>
+            <a:r>
+              <a:rPr lang="en-US" dirty="0" smtClean="0"/>
+              <a:t>Is it free or commercial?</a:t>
+            </a:r>
+            <a:endParaRPr lang="en-US" dirty="0" smtClean="0"/>
+          </a:p>
+          <a:p>
+            <a:endParaRPr lang="en-US" dirty="0" smtClean="0"/>
           </a:p>
           <a:p>
             <a:endParaRPr lang="en-US" dirty="0" smtClean="0"/>
@@ -6718,7 +6929,7 @@
 </p:sld>
 </file>
 
-<file path=ppt/slides/slide18.xml><?xml version="1.0" encoding="utf-8"?>
+<file path=ppt/slides/slide19.xml><?xml version="1.0" encoding="utf-8"?>
 <p:sld xmlns:a="http://schemas.openxmlformats.org/drawingml/2006/main" xmlns:r="http://schemas.openxmlformats.org/officeDocument/2006/relationships" xmlns:p="http://schemas.openxmlformats.org/presentationml/2006/main">
   <p:cSld>
     <p:spTree>
@@ -6752,7 +6963,7 @@
           <a:p>
             <a:r>
               <a:rPr lang="en-US" dirty="0" smtClean="0"/>
-              <a:t>Outro</a:t>
+              <a:t>Guesstimate</a:t>
             </a:r>
             <a:endParaRPr lang="en-US" dirty="0"/>
           </a:p>
@@ -6773,10 +6984,6 @@
           <a:bodyPr/>
           <a:lstStyle/>
           <a:p>
-            <a:r>
-              <a:rPr lang="en-US" dirty="0" smtClean="0"/>
-              <a:t>[stuff]</a:t>
-            </a:r>
             <a:endParaRPr lang="en-US" dirty="0"/>
           </a:p>
         </p:txBody>
@@ -6796,10 +7003,6 @@
           <a:bodyPr/>
           <a:lstStyle/>
           <a:p>
-            <a:r>
-              <a:rPr lang="en-US" dirty="0" smtClean="0"/>
-              <a:t>[more stuff]</a:t>
-            </a:r>
             <a:endParaRPr lang="en-US" dirty="0"/>
           </a:p>
         </p:txBody>
@@ -6908,19 +7111,8 @@
           <a:p>
             <a:r>
               <a:rPr lang="en-US" dirty="0" smtClean="0"/>
-              <a:t>Stachu.NET, </a:t>
-            </a:r>
-            <a:r>
-              <a:rPr lang="en-US" dirty="0" smtClean="0">
-                <a:hlinkClick r:id="rId2"/>
-              </a:rPr>
-              <a:t>StachuKorick@gmail.com</a:t>
-            </a:r>
-            <a:r>
-              <a:rPr lang="en-US" dirty="0" smtClean="0"/>
-              <a:t>, @stachuk1992</a:t>
-            </a:r>
-            <a:endParaRPr lang="en-US" dirty="0" smtClean="0"/>
+              <a:t>Contact info on last slide</a:t>
+            </a:r>
           </a:p>
           <a:p>
             <a:endParaRPr lang="en-US" dirty="0" smtClean="0"/>
@@ -6940,7 +7132,7 @@
             <a:pPr lvl="1"/>
             <a:r>
               <a:rPr lang="en-US" dirty="0" smtClean="0"/>
-              <a:t>&lt;1 mi. from here</a:t>
+              <a:t>&lt; 1 mi. from here</a:t>
             </a:r>
           </a:p>
           <a:p>
@@ -6948,6 +7140,13 @@
             <a:r>
               <a:rPr lang="en-US" dirty="0" smtClean="0"/>
               <a:t>.NET stuff, education space</a:t>
+            </a:r>
+          </a:p>
+          <a:p>
+            <a:pPr lvl="1"/>
+            <a:r>
+              <a:rPr lang="en-US" dirty="0" smtClean="0"/>
+              <a:t>Awesome company, see boss man in back.</a:t>
             </a:r>
             <a:endParaRPr lang="en-US" dirty="0"/>
           </a:p>
@@ -6985,6 +7184,179 @@
 </p:sld>
 </file>
 
+<file path=ppt/slides/slide20.xml><?xml version="1.0" encoding="utf-8"?>
+<p:sld xmlns:a="http://schemas.openxmlformats.org/drawingml/2006/main" xmlns:r="http://schemas.openxmlformats.org/officeDocument/2006/relationships" xmlns:p="http://schemas.openxmlformats.org/presentationml/2006/main">
+  <p:cSld>
+    <p:spTree>
+      <p:nvGrpSpPr>
+        <p:cNvPr id="1" name=""/>
+        <p:cNvGrpSpPr/>
+        <p:nvPr/>
+      </p:nvGrpSpPr>
+      <p:grpSpPr>
+        <a:xfrm>
+          <a:off x="0" y="0"/>
+          <a:ext cx="0" cy="0"/>
+          <a:chOff x="0" y="0"/>
+          <a:chExt cx="0" cy="0"/>
+        </a:xfrm>
+      </p:grpSpPr>
+      <p:sp>
+        <p:nvSpPr>
+          <p:cNvPr id="2" name="Title 1"/>
+          <p:cNvSpPr>
+            <a:spLocks noGrp="1"/>
+          </p:cNvSpPr>
+          <p:nvPr>
+            <p:ph type="title"/>
+          </p:nvPr>
+        </p:nvSpPr>
+        <p:spPr/>
+        <p:txBody>
+          <a:bodyPr/>
+          <a:lstStyle/>
+          <a:p>
+            <a:r>
+              <a:rPr lang="en-US" dirty="0" smtClean="0"/>
+              <a:t>Outro</a:t>
+            </a:r>
+            <a:endParaRPr lang="en-US" dirty="0"/>
+          </a:p>
+        </p:txBody>
+      </p:sp>
+      <p:sp>
+        <p:nvSpPr>
+          <p:cNvPr id="3" name="Content Placeholder 2"/>
+          <p:cNvSpPr>
+            <a:spLocks noGrp="1"/>
+          </p:cNvSpPr>
+          <p:nvPr>
+            <p:ph sz="half" idx="1"/>
+          </p:nvPr>
+        </p:nvSpPr>
+        <p:spPr/>
+        <p:txBody>
+          <a:bodyPr/>
+          <a:lstStyle/>
+          <a:p>
+            <a:r>
+              <a:rPr lang="en-US" dirty="0" smtClean="0"/>
+              <a:t>Thanks!</a:t>
+            </a:r>
+          </a:p>
+          <a:p>
+            <a:r>
+              <a:rPr lang="en-US" dirty="0" smtClean="0"/>
+              <a:t>Any last questions?</a:t>
+            </a:r>
+            <a:endParaRPr lang="en-US" dirty="0" smtClean="0"/>
+          </a:p>
+          <a:p>
+            <a:endParaRPr lang="en-US" dirty="0"/>
+          </a:p>
+        </p:txBody>
+      </p:sp>
+      <p:sp>
+        <p:nvSpPr>
+          <p:cNvPr id="4" name="Content Placeholder 3"/>
+          <p:cNvSpPr>
+            <a:spLocks noGrp="1"/>
+          </p:cNvSpPr>
+          <p:nvPr>
+            <p:ph sz="half" idx="2"/>
+          </p:nvPr>
+        </p:nvSpPr>
+        <p:spPr/>
+        <p:txBody>
+          <a:bodyPr/>
+          <a:lstStyle/>
+          <a:p>
+            <a:r>
+              <a:rPr lang="en-US" dirty="0" smtClean="0"/>
+              <a:t>Contact:</a:t>
+            </a:r>
+          </a:p>
+          <a:p>
+            <a:pPr lvl="1"/>
+            <a:r>
+              <a:rPr lang="en-US" dirty="0" smtClean="0">
+                <a:hlinkClick r:id="rId2"/>
+              </a:rPr>
+              <a:t>StachuKorick@gmail.com</a:t>
+            </a:r>
+            <a:endParaRPr lang="en-US" dirty="0" smtClean="0"/>
+          </a:p>
+          <a:p>
+            <a:pPr lvl="1"/>
+            <a:r>
+              <a:rPr lang="en-US" dirty="0" smtClean="0"/>
+              <a:t>Stachu.NET [blog soon!]</a:t>
+            </a:r>
+          </a:p>
+          <a:p>
+            <a:pPr lvl="1"/>
+            <a:r>
+              <a:rPr lang="en-US" dirty="0" smtClean="0"/>
+              <a:t>Talk to me right after, get card.</a:t>
+            </a:r>
+          </a:p>
+          <a:p>
+            <a:pPr lvl="1"/>
+            <a:r>
+              <a:rPr lang="en-US" dirty="0" smtClean="0"/>
+              <a:t>@StachuK1992</a:t>
+            </a:r>
+          </a:p>
+          <a:p>
+            <a:pPr lvl="1"/>
+            <a:r>
+              <a:rPr lang="en-US" dirty="0" smtClean="0"/>
+              <a:t>Just google “</a:t>
+            </a:r>
+            <a:r>
+              <a:rPr lang="en-US" dirty="0" err="1" smtClean="0"/>
+              <a:t>Stachu</a:t>
+            </a:r>
+            <a:r>
+              <a:rPr lang="en-US" dirty="0" smtClean="0"/>
+              <a:t>.”</a:t>
+            </a:r>
+            <a:endParaRPr lang="en-US" dirty="0"/>
+          </a:p>
+        </p:txBody>
+      </p:sp>
+    </p:spTree>
+    <p:extLst>
+      <p:ext uri="{BB962C8B-B14F-4D97-AF65-F5344CB8AC3E}">
+        <p14:creationId xmlns:p14="http://schemas.microsoft.com/office/powerpoint/2010/main" val="1625616585"/>
+      </p:ext>
+    </p:extLst>
+  </p:cSld>
+  <p:clrMapOvr>
+    <a:masterClrMapping/>
+  </p:clrMapOvr>
+  <mc:AlternateContent xmlns:mc="http://schemas.openxmlformats.org/markup-compatibility/2006">
+    <mc:Choice xmlns:p14="http://schemas.microsoft.com/office/powerpoint/2010/main" Requires="p14">
+      <p:transition spd="med" p14:dur="700">
+        <p:fade/>
+      </p:transition>
+    </mc:Choice>
+    <mc:Fallback>
+      <p:transition spd="med">
+        <p:fade/>
+      </p:transition>
+    </mc:Fallback>
+  </mc:AlternateContent>
+  <p:timing>
+    <p:tnLst>
+      <p:par>
+        <p:cTn id="1" dur="indefinite" restart="never" nodeType="tmRoot"/>
+      </p:par>
+    </p:tnLst>
+  </p:timing>
+</p:sld>
+</file>
+
 <file path=ppt/slides/slide3.xml><?xml version="1.0" encoding="utf-8"?>
 <p:sld xmlns:a="http://schemas.openxmlformats.org/drawingml/2006/main" xmlns:r="http://schemas.openxmlformats.org/officeDocument/2006/relationships" xmlns:p="http://schemas.openxmlformats.org/presentationml/2006/main">
   <p:cSld>
@@ -7019,7 +7391,7 @@
           <a:p>
             <a:r>
               <a:rPr lang="en-US" dirty="0" smtClean="0"/>
-              <a:t>Organization of this Talk</a:t>
+              <a:t>What is this talk?</a:t>
             </a:r>
             <a:endParaRPr lang="en-US" dirty="0"/>
           </a:p>
@@ -7042,20 +7414,150 @@
           <a:p>
             <a:r>
               <a:rPr lang="en-US" dirty="0" smtClean="0"/>
-              <a:t>Tech overview</a:t>
-            </a:r>
-          </a:p>
-          <a:p>
+              <a:t>Give back</a:t>
+            </a:r>
+          </a:p>
+          <a:p>
+            <a:r>
+              <a:rPr lang="en-US" dirty="0" smtClean="0"/>
+              <a:t>“Indie” .NET is just awesome</a:t>
+            </a:r>
+          </a:p>
+          <a:p>
+            <a:pPr lvl="1"/>
+            <a:r>
+              <a:rPr lang="en-US" dirty="0" smtClean="0"/>
+              <a:t>Where all the cool kids are.</a:t>
+            </a:r>
+          </a:p>
+          <a:p>
+            <a:endParaRPr lang="en-US" dirty="0"/>
+          </a:p>
+        </p:txBody>
+      </p:sp>
+    </p:spTree>
+    <p:extLst>
+      <p:ext uri="{BB962C8B-B14F-4D97-AF65-F5344CB8AC3E}">
+        <p14:creationId xmlns:p14="http://schemas.microsoft.com/office/powerpoint/2010/main" val="2074147525"/>
+      </p:ext>
+    </p:extLst>
+  </p:cSld>
+  <p:clrMapOvr>
+    <a:masterClrMapping/>
+  </p:clrMapOvr>
+  <mc:AlternateContent xmlns:mc="http://schemas.openxmlformats.org/markup-compatibility/2006">
+    <mc:Choice xmlns:p14="http://schemas.microsoft.com/office/powerpoint/2010/main" Requires="p14">
+      <p:transition spd="med" p14:dur="700">
+        <p:fade/>
+      </p:transition>
+    </mc:Choice>
+    <mc:Fallback>
+      <p:transition spd="med">
+        <p:fade/>
+      </p:transition>
+    </mc:Fallback>
+  </mc:AlternateContent>
+  <p:timing>
+    <p:tnLst>
+      <p:par>
+        <p:cTn id="1" dur="indefinite" restart="never" nodeType="tmRoot"/>
+      </p:par>
+    </p:tnLst>
+  </p:timing>
+</p:sld>
+</file>
+
+<file path=ppt/slides/slide4.xml><?xml version="1.0" encoding="utf-8"?>
+<p:sld xmlns:a="http://schemas.openxmlformats.org/drawingml/2006/main" xmlns:r="http://schemas.openxmlformats.org/officeDocument/2006/relationships" xmlns:p="http://schemas.openxmlformats.org/presentationml/2006/main">
+  <p:cSld>
+    <p:spTree>
+      <p:nvGrpSpPr>
+        <p:cNvPr id="1" name=""/>
+        <p:cNvGrpSpPr/>
+        <p:nvPr/>
+      </p:nvGrpSpPr>
+      <p:grpSpPr>
+        <a:xfrm>
+          <a:off x="0" y="0"/>
+          <a:ext cx="0" cy="0"/>
+          <a:chOff x="0" y="0"/>
+          <a:chExt cx="0" cy="0"/>
+        </a:xfrm>
+      </p:grpSpPr>
+      <p:sp>
+        <p:nvSpPr>
+          <p:cNvPr id="13" name="Title 12"/>
+          <p:cNvSpPr>
+            <a:spLocks noGrp="1"/>
+          </p:cNvSpPr>
+          <p:nvPr>
+            <p:ph type="title"/>
+          </p:nvPr>
+        </p:nvSpPr>
+        <p:spPr/>
+        <p:txBody>
+          <a:bodyPr/>
+          <a:lstStyle/>
+          <a:p>
+            <a:r>
+              <a:rPr lang="en-US" dirty="0" smtClean="0"/>
+              <a:t>Organization of this Talk</a:t>
+            </a:r>
+            <a:endParaRPr lang="en-US" dirty="0"/>
+          </a:p>
+        </p:txBody>
+      </p:sp>
+      <p:sp>
+        <p:nvSpPr>
+          <p:cNvPr id="14" name="Content Placeholder 13"/>
+          <p:cNvSpPr>
+            <a:spLocks noGrp="1"/>
+          </p:cNvSpPr>
+          <p:nvPr>
+            <p:ph idx="1"/>
+          </p:nvPr>
+        </p:nvSpPr>
+        <p:spPr/>
+        <p:txBody>
+          <a:bodyPr/>
+          <a:lstStyle/>
+          <a:p>
+            <a:r>
+              <a:rPr lang="en-US" dirty="0" smtClean="0"/>
+              <a:t>{</a:t>
+            </a:r>
+          </a:p>
+          <a:p>
+            <a:pPr lvl="1"/>
+            <a:r>
+              <a:rPr lang="en-US" dirty="0" smtClean="0"/>
+              <a:t>Tech </a:t>
+            </a:r>
+            <a:r>
+              <a:rPr lang="en-US" dirty="0" smtClean="0"/>
+              <a:t>overview</a:t>
+            </a:r>
+          </a:p>
+          <a:p>
+            <a:pPr lvl="1"/>
             <a:r>
               <a:rPr lang="en-US" dirty="0" smtClean="0"/>
               <a:t>Speed-lesson</a:t>
             </a:r>
           </a:p>
           <a:p>
+            <a:pPr lvl="1"/>
             <a:r>
               <a:rPr lang="en-US" dirty="0" smtClean="0"/>
               <a:t>Questions</a:t>
             </a:r>
+          </a:p>
+          <a:p>
+            <a:r>
+              <a:rPr lang="en-US" dirty="0" smtClean="0"/>
+              <a:t>} * 3</a:t>
+            </a:r>
+            <a:endParaRPr lang="en-US" dirty="0" smtClean="0"/>
           </a:p>
           <a:p>
             <a:endParaRPr lang="en-US" dirty="0"/>
@@ -7105,7 +7607,7 @@
 </p:sld>
 </file>
 
-<file path=ppt/slides/slide4.xml><?xml version="1.0" encoding="utf-8"?>
+<file path=ppt/slides/slide5.xml><?xml version="1.0" encoding="utf-8"?>
 <p:sld xmlns:a="http://schemas.openxmlformats.org/drawingml/2006/main" xmlns:r="http://schemas.openxmlformats.org/officeDocument/2006/relationships" xmlns:p="http://schemas.openxmlformats.org/presentationml/2006/main">
   <p:cSld>
     <p:spTree>
@@ -7282,7 +7784,7 @@
 </p:sld>
 </file>
 
-<file path=ppt/slides/slide5.xml><?xml version="1.0" encoding="utf-8"?>
+<file path=ppt/slides/slide6.xml><?xml version="1.0" encoding="utf-8"?>
 <p:sld xmlns:a="http://schemas.openxmlformats.org/drawingml/2006/main" xmlns:r="http://schemas.openxmlformats.org/officeDocument/2006/relationships" xmlns:p="http://schemas.openxmlformats.org/presentationml/2006/main">
   <p:cSld>
     <p:spTree>
@@ -7462,7 +7964,7 @@
 </p:sld>
 </file>
 
-<file path=ppt/slides/slide6.xml><?xml version="1.0" encoding="utf-8"?>
+<file path=ppt/slides/slide7.xml><?xml version="1.0" encoding="utf-8"?>
 <p:sld xmlns:a="http://schemas.openxmlformats.org/drawingml/2006/main" xmlns:r="http://schemas.openxmlformats.org/officeDocument/2006/relationships" xmlns:p="http://schemas.openxmlformats.org/presentationml/2006/main">
   <p:cSld>
     <p:spTree>
@@ -7645,7 +8147,7 @@
 </p:sld>
 </file>
 
-<file path=ppt/slides/slide7.xml><?xml version="1.0" encoding="utf-8"?>
+<file path=ppt/slides/slide8.xml><?xml version="1.0" encoding="utf-8"?>
 <p:sld xmlns:a="http://schemas.openxmlformats.org/drawingml/2006/main" xmlns:r="http://schemas.openxmlformats.org/officeDocument/2006/relationships" xmlns:p="http://schemas.openxmlformats.org/presentationml/2006/main">
   <p:cSld>
     <p:spTree>
@@ -7798,7 +8300,7 @@
 </p:sld>
 </file>
 
-<file path=ppt/slides/slide8.xml><?xml version="1.0" encoding="utf-8"?>
+<file path=ppt/slides/slide9.xml><?xml version="1.0" encoding="utf-8"?>
 <p:sld xmlns:a="http://schemas.openxmlformats.org/drawingml/2006/main" xmlns:r="http://schemas.openxmlformats.org/officeDocument/2006/relationships" xmlns:p="http://schemas.openxmlformats.org/presentationml/2006/main">
   <p:cSld>
     <p:spTree>
@@ -7940,211 +8442,6 @@
       </p:transition>
     </mc:Choice>
     <mc:Fallback>
-      <p:transition spd="med">
-        <p:fade/>
-      </p:transition>
-    </mc:Fallback>
-  </mc:AlternateContent>
-  <p:timing>
-    <p:tnLst>
-      <p:par>
-        <p:cTn id="1" dur="indefinite" restart="never" nodeType="tmRoot"/>
-      </p:par>
-    </p:tnLst>
-  </p:timing>
-</p:sld>
-</file>
-
-<file path=ppt/slides/slide9.xml><?xml version="1.0" encoding="utf-8"?>
-<p:sld xmlns:a="http://schemas.openxmlformats.org/drawingml/2006/main" xmlns:r="http://schemas.openxmlformats.org/officeDocument/2006/relationships" xmlns:p="http://schemas.openxmlformats.org/presentationml/2006/main">
-  <p:cSld>
-    <p:spTree>
-      <p:nvGrpSpPr>
-        <p:cNvPr id="1" name=""/>
-        <p:cNvGrpSpPr/>
-        <p:nvPr/>
-      </p:nvGrpSpPr>
-      <p:grpSpPr>
-        <a:xfrm>
-          <a:off x="0" y="0"/>
-          <a:ext cx="0" cy="0"/>
-          <a:chOff x="0" y="0"/>
-          <a:chExt cx="0" cy="0"/>
-        </a:xfrm>
-      </p:grpSpPr>
-      <p:sp>
-        <p:nvSpPr>
-          <p:cNvPr id="2" name="Title 1"/>
-          <p:cNvSpPr>
-            <a:spLocks noGrp="1"/>
-          </p:cNvSpPr>
-          <p:nvPr>
-            <p:ph type="title"/>
-          </p:nvPr>
-        </p:nvSpPr>
-        <p:spPr/>
-        <p:txBody>
-          <a:bodyPr/>
-          <a:lstStyle/>
-          <a:p>
-            <a:r>
-              <a:rPr lang="en-US" dirty="0" err="1" smtClean="0"/>
-              <a:t>SignalR</a:t>
-            </a:r>
-            <a:r>
-              <a:rPr lang="en-US" dirty="0" smtClean="0"/>
-              <a:t> – Micro-demo.</a:t>
-            </a:r>
-            <a:endParaRPr lang="en-US" dirty="0"/>
-          </a:p>
-        </p:txBody>
-      </p:sp>
-      <p:sp>
-        <p:nvSpPr>
-          <p:cNvPr id="3" name="Content Placeholder 2"/>
-          <p:cNvSpPr>
-            <a:spLocks noGrp="1"/>
-          </p:cNvSpPr>
-          <p:nvPr>
-            <p:ph sz="half" idx="1"/>
-          </p:nvPr>
-        </p:nvSpPr>
-        <p:spPr>
-          <a:xfrm>
-            <a:off x="5151358" y="1752600"/>
-            <a:ext cx="6658054" cy="4465320"/>
-          </a:xfrm>
-        </p:spPr>
-        <p:txBody>
-          <a:bodyPr/>
-          <a:lstStyle/>
-          <a:p>
-            <a:pPr marL="514350" indent="-514350">
-              <a:buFont typeface="+mj-lt"/>
-              <a:buAutoNum type="arabicPeriod"/>
-            </a:pPr>
-            <a:r>
-              <a:rPr lang="en-US" dirty="0" smtClean="0"/>
-              <a:t>Install-Package </a:t>
-            </a:r>
-            <a:r>
-              <a:rPr lang="en-US" dirty="0" err="1" smtClean="0"/>
-              <a:t>Microsoft.AspNet.SignalR</a:t>
-            </a:r>
-            <a:endParaRPr lang="en-US" dirty="0" smtClean="0"/>
-          </a:p>
-          <a:p>
-            <a:pPr marL="514350" indent="-514350">
-              <a:buFont typeface="+mj-lt"/>
-              <a:buAutoNum type="arabicPeriod"/>
-            </a:pPr>
-            <a:r>
-              <a:rPr lang="en-US" dirty="0" err="1" smtClean="0"/>
-              <a:t>App.MapSignalR</a:t>
-            </a:r>
-            <a:r>
-              <a:rPr lang="en-US" dirty="0" smtClean="0"/>
-              <a:t>()</a:t>
-            </a:r>
-          </a:p>
-          <a:p>
-            <a:pPr marL="514350" indent="-514350">
-              <a:buFont typeface="+mj-lt"/>
-              <a:buAutoNum type="arabicPeriod"/>
-            </a:pPr>
-            <a:r>
-              <a:rPr lang="en-US" dirty="0" smtClean="0"/>
-              <a:t>Create a hub with a simple method.</a:t>
-            </a:r>
-          </a:p>
-          <a:p>
-            <a:pPr marL="514350" indent="-514350">
-              <a:buFont typeface="+mj-lt"/>
-              <a:buAutoNum type="arabicPeriod"/>
-            </a:pPr>
-            <a:r>
-              <a:rPr lang="en-US" dirty="0" smtClean="0"/>
-              <a:t>Create a </a:t>
-            </a:r>
-            <a:r>
-              <a:rPr lang="en-US" dirty="0" err="1" smtClean="0"/>
-              <a:t>js</a:t>
-            </a:r>
-            <a:r>
-              <a:rPr lang="en-US" dirty="0" smtClean="0"/>
-              <a:t> client with a simple method.</a:t>
-            </a:r>
-          </a:p>
-          <a:p>
-            <a:pPr marL="514350" indent="-514350">
-              <a:buFont typeface="+mj-lt"/>
-              <a:buAutoNum type="arabicPeriod"/>
-            </a:pPr>
-            <a:r>
-              <a:rPr lang="en-US" dirty="0" smtClean="0"/>
-              <a:t>Test!</a:t>
-            </a:r>
-          </a:p>
-        </p:txBody>
-      </p:sp>
-      <p:pic>
-        <p:nvPicPr>
-          <p:cNvPr id="2052" name="Picture 4" descr="http://blogciberdotcom.files.wordpress.com/2014/08/signalr.png?w=450"/>
-          <p:cNvPicPr>
-            <a:picLocks noChangeAspect="1" noChangeArrowheads="1"/>
-          </p:cNvPicPr>
-          <p:nvPr/>
-        </p:nvPicPr>
-        <p:blipFill>
-          <a:blip r:embed="rId2">
-            <a:extLst>
-              <a:ext uri="{28A0092B-C50C-407E-A947-70E740481C1C}">
-                <a14:useLocalDpi xmlns:a14="http://schemas.microsoft.com/office/drawing/2010/main" val="0"/>
-              </a:ext>
-            </a:extLst>
-          </a:blip>
-          <a:srcRect/>
-          <a:stretch>
-            <a:fillRect/>
-          </a:stretch>
-        </p:blipFill>
-        <p:spPr bwMode="auto">
-          <a:xfrm>
-            <a:off x="865108" y="1905000"/>
-            <a:ext cx="4286250" cy="2381250"/>
-          </a:xfrm>
-          <a:prstGeom prst="rect">
-            <a:avLst/>
-          </a:prstGeom>
-          <a:noFill/>
-          <a:extLst>
-            <a:ext uri="{909E8E84-426E-40DD-AFC4-6F175D3DCCD1}">
-              <a14:hiddenFill xmlns:a14="http://schemas.microsoft.com/office/drawing/2010/main">
-                <a:solidFill>
-                  <a:srgbClr val="FFFFFF"/>
-                </a:solidFill>
-              </a14:hiddenFill>
-            </a:ext>
-          </a:extLst>
-        </p:spPr>
-      </p:pic>
-    </p:spTree>
-    <p:extLst>
-      <p:ext uri="{BB962C8B-B14F-4D97-AF65-F5344CB8AC3E}">
-        <p14:creationId xmlns:p14="http://schemas.microsoft.com/office/powerpoint/2010/main" val="2177548063"/>
-      </p:ext>
-    </p:extLst>
-  </p:cSld>
-  <p:clrMapOvr>
-    <a:masterClrMapping/>
-  </p:clrMapOvr>
-  <mc:AlternateContent xmlns:mc="http://schemas.openxmlformats.org/markup-compatibility/2006" xmlns:p14="http://schemas.microsoft.com/office/powerpoint/2010/main">
-    <mc:Choice Requires="p14">
-      <p:transition spd="med" p14:dur="700">
-        <p:fade/>
-      </p:transition>
-    </mc:Choice>
-    <mc:Fallback xmlns="">
       <p:transition spd="med">
         <p:fade/>
       </p:transition>

</xml_diff>